<commit_message>
Spanish templates fixed in Beg and Advanced
</commit_message>
<xml_diff>
--- a/_site/translations/es/beginner/BasicLineFollower.pptx
+++ b/_site/translations/es/beginner/BasicLineFollower.pptx
@@ -1730,7 +1730,7 @@
           <a:noFill/>
           <a:extLst>
             <a:ext uri="{909E8E84-426E-40dd-AFC4-6F175D3DCCD1}">
-              <a14:hiddenFill xmlns:a14="http://schemas.microsoft.com/office/drawing/2010/main" xmlns="">
+              <a14:hiddenFill xmlns="" xmlns:a14="http://schemas.microsoft.com/office/drawing/2010/main">
                 <a:solidFill>
                   <a:srgbClr val="FFFFFF"/>
                 </a:solidFill>
@@ -13045,8 +13045,8 @@
           <a:lstStyle/>
           <a:p>
             <a:r>
-              <a:rPr lang="en-US" dirty="0" err="1"/>
-              <a:t>reconocimientoS</a:t>
+              <a:rPr lang="es-MX" dirty="0"/>
+              <a:t>Créditos</a:t>
             </a:r>
             <a:endParaRPr lang="en-US" dirty="0"/>
           </a:p>

</xml_diff>